<commit_message>
voorbeeld vopr de presentatie
</commit_message>
<xml_diff>
--- a/Presentaties_versie_d/01 Docker en Env.pptx
+++ b/Presentaties_versie_d/01 Docker en Env.pptx
@@ -5,22 +5,23 @@
     <p:sldMasterId id="2147483660" r:id="rId1"/>
   </p:sldMasterIdLst>
   <p:notesMasterIdLst>
-    <p:notesMasterId r:id="rId15"/>
+    <p:notesMasterId r:id="rId16"/>
   </p:notesMasterIdLst>
   <p:sldIdLst>
     <p:sldId id="256" r:id="rId2"/>
     <p:sldId id="257" r:id="rId3"/>
-    <p:sldId id="258" r:id="rId4"/>
-    <p:sldId id="271" r:id="rId5"/>
-    <p:sldId id="272" r:id="rId6"/>
-    <p:sldId id="273" r:id="rId7"/>
-    <p:sldId id="274" r:id="rId8"/>
-    <p:sldId id="275" r:id="rId9"/>
-    <p:sldId id="276" r:id="rId10"/>
-    <p:sldId id="279" r:id="rId11"/>
-    <p:sldId id="277" r:id="rId12"/>
-    <p:sldId id="278" r:id="rId13"/>
-    <p:sldId id="270" r:id="rId14"/>
+    <p:sldId id="280" r:id="rId4"/>
+    <p:sldId id="258" r:id="rId5"/>
+    <p:sldId id="271" r:id="rId6"/>
+    <p:sldId id="272" r:id="rId7"/>
+    <p:sldId id="273" r:id="rId8"/>
+    <p:sldId id="274" r:id="rId9"/>
+    <p:sldId id="275" r:id="rId10"/>
+    <p:sldId id="276" r:id="rId11"/>
+    <p:sldId id="279" r:id="rId12"/>
+    <p:sldId id="277" r:id="rId13"/>
+    <p:sldId id="278" r:id="rId14"/>
+    <p:sldId id="270" r:id="rId15"/>
   </p:sldIdLst>
   <p:sldSz cx="12192000" cy="6858000"/>
   <p:notesSz cx="6858000" cy="9144000"/>
@@ -130,8 +131,7 @@
 <file path=ppt/revisionInfo.xml><?xml version="1.0" encoding="utf-8"?>
 <p1510:revInfo xmlns:a="http://schemas.openxmlformats.org/drawingml/2006/main" xmlns:r="http://schemas.openxmlformats.org/officeDocument/2006/relationships" xmlns:p1510="http://schemas.microsoft.com/office/powerpoint/2015/10/main">
   <p1510:revLst>
-    <p1510:client id="{2186643C-DB26-4019-9494-1F001C07D11F}" v="7" dt="2025-09-05T06:44:28.805"/>
-    <p1510:client id="{50CBEB6C-8F96-4749-96F1-4CC5A2A7C5AC}" v="48" dt="2025-09-05T06:56:20.613"/>
+    <p1510:client id="{50CBEB6C-8F96-4749-96F1-4CC5A2A7C5AC}" v="50" dt="2025-09-09T09:58:13.189"/>
   </p1510:revLst>
 </p1510:revInfo>
 </file>
@@ -141,12 +141,12 @@
   <pc:docChgLst>
     <pc:chgData name="Dragan Javorac" userId="913c2858-fb97-4c6e-a42c-b1f1a16b225e" providerId="ADAL" clId="{BC00D9DF-F858-4149-8B7B-F211D448CEDA}"/>
     <pc:docChg chg="undo custSel addSld delSld modSld sldOrd">
-      <pc:chgData name="Dragan Javorac" userId="913c2858-fb97-4c6e-a42c-b1f1a16b225e" providerId="ADAL" clId="{BC00D9DF-F858-4149-8B7B-F211D448CEDA}" dt="2025-09-05T06:56:55.707" v="1334" actId="20577"/>
+      <pc:chgData name="Dragan Javorac" userId="913c2858-fb97-4c6e-a42c-b1f1a16b225e" providerId="ADAL" clId="{BC00D9DF-F858-4149-8B7B-F211D448CEDA}" dt="2025-09-09T10:02:02.137" v="1535" actId="14"/>
       <pc:docMkLst>
         <pc:docMk/>
       </pc:docMkLst>
-      <pc:sldChg chg="modSp">
-        <pc:chgData name="Dragan Javorac" userId="913c2858-fb97-4c6e-a42c-b1f1a16b225e" providerId="ADAL" clId="{BC00D9DF-F858-4149-8B7B-F211D448CEDA}" dt="2025-09-05T06:46:51.137" v="454"/>
+      <pc:sldChg chg="modSp mod">
+        <pc:chgData name="Dragan Javorac" userId="913c2858-fb97-4c6e-a42c-b1f1a16b225e" providerId="ADAL" clId="{BC00D9DF-F858-4149-8B7B-F211D448CEDA}" dt="2025-09-09T09:57:20.265" v="1400" actId="20577"/>
         <pc:sldMkLst>
           <pc:docMk/>
           <pc:sldMk cId="2370235096" sldId="256"/>
@@ -159,15 +159,23 @@
             <ac:spMk id="2" creationId="{0B1D3E4B-FB02-7051-2AC1-532986725926}"/>
           </ac:spMkLst>
         </pc:spChg>
+        <pc:spChg chg="mod">
+          <ac:chgData name="Dragan Javorac" userId="913c2858-fb97-4c6e-a42c-b1f1a16b225e" providerId="ADAL" clId="{BC00D9DF-F858-4149-8B7B-F211D448CEDA}" dt="2025-09-09T09:57:20.265" v="1400" actId="20577"/>
+          <ac:spMkLst>
+            <pc:docMk/>
+            <pc:sldMk cId="2370235096" sldId="256"/>
+            <ac:spMk id="3" creationId="{9A24CF7F-C99D-AFDD-18B4-A8BFC90CD9DC}"/>
+          </ac:spMkLst>
+        </pc:spChg>
       </pc:sldChg>
       <pc:sldChg chg="modSp mod">
-        <pc:chgData name="Dragan Javorac" userId="913c2858-fb97-4c6e-a42c-b1f1a16b225e" providerId="ADAL" clId="{BC00D9DF-F858-4149-8B7B-F211D448CEDA}" dt="2025-09-05T06:46:47.041" v="453" actId="6549"/>
+        <pc:chgData name="Dragan Javorac" userId="913c2858-fb97-4c6e-a42c-b1f1a16b225e" providerId="ADAL" clId="{BC00D9DF-F858-4149-8B7B-F211D448CEDA}" dt="2025-09-09T09:57:27.049" v="1419" actId="20577"/>
         <pc:sldMkLst>
           <pc:docMk/>
           <pc:sldMk cId="3642134840" sldId="257"/>
         </pc:sldMkLst>
         <pc:spChg chg="mod">
-          <ac:chgData name="Dragan Javorac" userId="913c2858-fb97-4c6e-a42c-b1f1a16b225e" providerId="ADAL" clId="{BC00D9DF-F858-4149-8B7B-F211D448CEDA}" dt="2025-09-05T06:46:47.041" v="453" actId="6549"/>
+          <ac:chgData name="Dragan Javorac" userId="913c2858-fb97-4c6e-a42c-b1f1a16b225e" providerId="ADAL" clId="{BC00D9DF-F858-4149-8B7B-F211D448CEDA}" dt="2025-09-09T09:57:27.049" v="1419" actId="20577"/>
           <ac:spMkLst>
             <pc:docMk/>
             <pc:sldMk cId="3642134840" sldId="257"/>
@@ -176,7 +184,7 @@
         </pc:spChg>
       </pc:sldChg>
       <pc:sldChg chg="addSp delSp modSp mod">
-        <pc:chgData name="Dragan Javorac" userId="913c2858-fb97-4c6e-a42c-b1f1a16b225e" providerId="ADAL" clId="{BC00D9DF-F858-4149-8B7B-F211D448CEDA}" dt="2025-09-05T06:47:51.748" v="577" actId="20577"/>
+        <pc:chgData name="Dragan Javorac" userId="913c2858-fb97-4c6e-a42c-b1f1a16b225e" providerId="ADAL" clId="{BC00D9DF-F858-4149-8B7B-F211D448CEDA}" dt="2025-09-09T06:26:03.926" v="1378" actId="20577"/>
         <pc:sldMkLst>
           <pc:docMk/>
           <pc:sldMk cId="2280464665" sldId="258"/>
@@ -190,7 +198,7 @@
           </ac:spMkLst>
         </pc:spChg>
         <pc:spChg chg="mod">
-          <ac:chgData name="Dragan Javorac" userId="913c2858-fb97-4c6e-a42c-b1f1a16b225e" providerId="ADAL" clId="{BC00D9DF-F858-4149-8B7B-F211D448CEDA}" dt="2025-09-05T06:47:51.748" v="577" actId="20577"/>
+          <ac:chgData name="Dragan Javorac" userId="913c2858-fb97-4c6e-a42c-b1f1a16b225e" providerId="ADAL" clId="{BC00D9DF-F858-4149-8B7B-F211D448CEDA}" dt="2025-09-09T06:26:03.926" v="1378" actId="20577"/>
           <ac:spMkLst>
             <pc:docMk/>
             <pc:sldMk cId="2280464665" sldId="258"/>
@@ -203,22 +211,6 @@
             <pc:docMk/>
             <pc:sldMk cId="2280464665" sldId="258"/>
             <ac:picMk id="5" creationId="{88BC752A-CA04-45FD-4FE9-567D3E75C623}"/>
-          </ac:picMkLst>
-        </pc:picChg>
-        <pc:picChg chg="del">
-          <ac:chgData name="Dragan Javorac" userId="913c2858-fb97-4c6e-a42c-b1f1a16b225e" providerId="ADAL" clId="{BC00D9DF-F858-4149-8B7B-F211D448CEDA}" dt="2025-09-05T06:47:02.424" v="457" actId="478"/>
-          <ac:picMkLst>
-            <pc:docMk/>
-            <pc:sldMk cId="2280464665" sldId="258"/>
-            <ac:picMk id="7" creationId="{2A1572E7-B2CF-2738-C348-F31EEA22732A}"/>
-          </ac:picMkLst>
-        </pc:picChg>
-        <pc:picChg chg="del">
-          <ac:chgData name="Dragan Javorac" userId="913c2858-fb97-4c6e-a42c-b1f1a16b225e" providerId="ADAL" clId="{BC00D9DF-F858-4149-8B7B-F211D448CEDA}" dt="2025-09-05T06:47:02.784" v="458" actId="478"/>
-          <ac:picMkLst>
-            <pc:docMk/>
-            <pc:sldMk cId="2280464665" sldId="258"/>
-            <ac:picMk id="9" creationId="{D2FBECDB-2327-CCB1-7313-46FB37BABF1A}"/>
           </ac:picMkLst>
         </pc:picChg>
       </pc:sldChg>
@@ -277,22 +269,6 @@
           <pc:docMk/>
           <pc:sldMk cId="2396596277" sldId="266"/>
         </pc:sldMkLst>
-        <pc:spChg chg="mod">
-          <ac:chgData name="Dragan Javorac" userId="913c2858-fb97-4c6e-a42c-b1f1a16b225e" providerId="ADAL" clId="{BC00D9DF-F858-4149-8B7B-F211D448CEDA}" dt="2025-09-05T06:39:38.351" v="11" actId="20577"/>
-          <ac:spMkLst>
-            <pc:docMk/>
-            <pc:sldMk cId="2396596277" sldId="266"/>
-            <ac:spMk id="2" creationId="{5356DF29-4B91-0209-FE02-BCD4BF808F03}"/>
-          </ac:spMkLst>
-        </pc:spChg>
-        <pc:spChg chg="mod">
-          <ac:chgData name="Dragan Javorac" userId="913c2858-fb97-4c6e-a42c-b1f1a16b225e" providerId="ADAL" clId="{BC00D9DF-F858-4149-8B7B-F211D448CEDA}" dt="2025-09-05T06:40:07.795" v="20" actId="27636"/>
-          <ac:spMkLst>
-            <pc:docMk/>
-            <pc:sldMk cId="2396596277" sldId="266"/>
-            <ac:spMk id="3" creationId="{8FC4C594-4FD4-0520-C006-57D59B045432}"/>
-          </ac:spMkLst>
-        </pc:spChg>
       </pc:sldChg>
       <pc:sldChg chg="addSp modSp add del mod">
         <pc:chgData name="Dragan Javorac" userId="913c2858-fb97-4c6e-a42c-b1f1a16b225e" providerId="ADAL" clId="{BC00D9DF-F858-4149-8B7B-F211D448CEDA}" dt="2025-09-05T06:46:31.475" v="449" actId="47"/>
@@ -300,38 +276,6 @@
           <pc:docMk/>
           <pc:sldMk cId="3422021876" sldId="267"/>
         </pc:sldMkLst>
-        <pc:spChg chg="mod">
-          <ac:chgData name="Dragan Javorac" userId="913c2858-fb97-4c6e-a42c-b1f1a16b225e" providerId="ADAL" clId="{BC00D9DF-F858-4149-8B7B-F211D448CEDA}" dt="2025-09-05T06:40:39.958" v="31" actId="20577"/>
-          <ac:spMkLst>
-            <pc:docMk/>
-            <pc:sldMk cId="3422021876" sldId="267"/>
-            <ac:spMk id="2" creationId="{81882167-530F-47C8-7889-C8003E178D7F}"/>
-          </ac:spMkLst>
-        </pc:spChg>
-        <pc:spChg chg="mod">
-          <ac:chgData name="Dragan Javorac" userId="913c2858-fb97-4c6e-a42c-b1f1a16b225e" providerId="ADAL" clId="{BC00D9DF-F858-4149-8B7B-F211D448CEDA}" dt="2025-09-05T06:41:26.174" v="185" actId="20577"/>
-          <ac:spMkLst>
-            <pc:docMk/>
-            <pc:sldMk cId="3422021876" sldId="267"/>
-            <ac:spMk id="3" creationId="{7A1CA399-FC12-F16D-A81E-2CF8AE8D540C}"/>
-          </ac:spMkLst>
-        </pc:spChg>
-        <pc:picChg chg="add mod">
-          <ac:chgData name="Dragan Javorac" userId="913c2858-fb97-4c6e-a42c-b1f1a16b225e" providerId="ADAL" clId="{BC00D9DF-F858-4149-8B7B-F211D448CEDA}" dt="2025-09-05T06:41:39.666" v="190" actId="1076"/>
-          <ac:picMkLst>
-            <pc:docMk/>
-            <pc:sldMk cId="3422021876" sldId="267"/>
-            <ac:picMk id="5" creationId="{6FED2826-279A-230F-099A-64ABD7B9A08C}"/>
-          </ac:picMkLst>
-        </pc:picChg>
-        <pc:picChg chg="add mod">
-          <ac:chgData name="Dragan Javorac" userId="913c2858-fb97-4c6e-a42c-b1f1a16b225e" providerId="ADAL" clId="{BC00D9DF-F858-4149-8B7B-F211D448CEDA}" dt="2025-09-05T06:41:38.404" v="189" actId="1076"/>
-          <ac:picMkLst>
-            <pc:docMk/>
-            <pc:sldMk cId="3422021876" sldId="267"/>
-            <ac:picMk id="7" creationId="{B630E49F-3B8B-4397-E787-30378C85BB0F}"/>
-          </ac:picMkLst>
-        </pc:picChg>
       </pc:sldChg>
       <pc:sldChg chg="addSp delSp modSp add del mod">
         <pc:chgData name="Dragan Javorac" userId="913c2858-fb97-4c6e-a42c-b1f1a16b225e" providerId="ADAL" clId="{BC00D9DF-F858-4149-8B7B-F211D448CEDA}" dt="2025-09-05T06:46:31.475" v="449" actId="47"/>
@@ -339,46 +283,6 @@
           <pc:docMk/>
           <pc:sldMk cId="1854490597" sldId="268"/>
         </pc:sldMkLst>
-        <pc:spChg chg="mod">
-          <ac:chgData name="Dragan Javorac" userId="913c2858-fb97-4c6e-a42c-b1f1a16b225e" providerId="ADAL" clId="{BC00D9DF-F858-4149-8B7B-F211D448CEDA}" dt="2025-09-05T06:41:52.164" v="195" actId="20577"/>
-          <ac:spMkLst>
-            <pc:docMk/>
-            <pc:sldMk cId="1854490597" sldId="268"/>
-            <ac:spMk id="2" creationId="{8A026CCB-5FE5-F04C-7A4B-D034485D1603}"/>
-          </ac:spMkLst>
-        </pc:spChg>
-        <pc:spChg chg="mod">
-          <ac:chgData name="Dragan Javorac" userId="913c2858-fb97-4c6e-a42c-b1f1a16b225e" providerId="ADAL" clId="{BC00D9DF-F858-4149-8B7B-F211D448CEDA}" dt="2025-09-05T06:44:18.814" v="395" actId="20577"/>
-          <ac:spMkLst>
-            <pc:docMk/>
-            <pc:sldMk cId="1854490597" sldId="268"/>
-            <ac:spMk id="3" creationId="{E6E8C246-D95D-4297-8E51-B50B43F9054E}"/>
-          </ac:spMkLst>
-        </pc:spChg>
-        <pc:picChg chg="del">
-          <ac:chgData name="Dragan Javorac" userId="913c2858-fb97-4c6e-a42c-b1f1a16b225e" providerId="ADAL" clId="{BC00D9DF-F858-4149-8B7B-F211D448CEDA}" dt="2025-09-05T06:42:28.910" v="197" actId="478"/>
-          <ac:picMkLst>
-            <pc:docMk/>
-            <pc:sldMk cId="1854490597" sldId="268"/>
-            <ac:picMk id="5" creationId="{90D0E7FD-8496-F067-80EC-65B3729DBA1D}"/>
-          </ac:picMkLst>
-        </pc:picChg>
-        <pc:picChg chg="add mod">
-          <ac:chgData name="Dragan Javorac" userId="913c2858-fb97-4c6e-a42c-b1f1a16b225e" providerId="ADAL" clId="{BC00D9DF-F858-4149-8B7B-F211D448CEDA}" dt="2025-09-05T06:43:44.885" v="304" actId="1076"/>
-          <ac:picMkLst>
-            <pc:docMk/>
-            <pc:sldMk cId="1854490597" sldId="268"/>
-            <ac:picMk id="6" creationId="{A5C420C5-7851-3403-CABC-A1A70BF17D3F}"/>
-          </ac:picMkLst>
-        </pc:picChg>
-        <pc:picChg chg="del">
-          <ac:chgData name="Dragan Javorac" userId="913c2858-fb97-4c6e-a42c-b1f1a16b225e" providerId="ADAL" clId="{BC00D9DF-F858-4149-8B7B-F211D448CEDA}" dt="2025-09-05T06:42:31.118" v="198" actId="478"/>
-          <ac:picMkLst>
-            <pc:docMk/>
-            <pc:sldMk cId="1854490597" sldId="268"/>
-            <ac:picMk id="7" creationId="{9F6DD71E-7ADA-1F3E-58C8-5BA3D2DD2162}"/>
-          </ac:picMkLst>
-        </pc:picChg>
       </pc:sldChg>
       <pc:sldChg chg="modSp add del mod">
         <pc:chgData name="Dragan Javorac" userId="913c2858-fb97-4c6e-a42c-b1f1a16b225e" providerId="ADAL" clId="{BC00D9DF-F858-4149-8B7B-F211D448CEDA}" dt="2025-09-05T06:46:31.475" v="449" actId="47"/>
@@ -386,22 +290,6 @@
           <pc:docMk/>
           <pc:sldMk cId="1115742647" sldId="269"/>
         </pc:sldMkLst>
-        <pc:spChg chg="mod">
-          <ac:chgData name="Dragan Javorac" userId="913c2858-fb97-4c6e-a42c-b1f1a16b225e" providerId="ADAL" clId="{BC00D9DF-F858-4149-8B7B-F211D448CEDA}" dt="2025-09-05T06:44:22.898" v="397" actId="6549"/>
-          <ac:spMkLst>
-            <pc:docMk/>
-            <pc:sldMk cId="1115742647" sldId="269"/>
-            <ac:spMk id="3" creationId="{4AF55B0B-9808-FF68-7438-316A00867CFB}"/>
-          </ac:spMkLst>
-        </pc:spChg>
-        <pc:picChg chg="mod">
-          <ac:chgData name="Dragan Javorac" userId="913c2858-fb97-4c6e-a42c-b1f1a16b225e" providerId="ADAL" clId="{BC00D9DF-F858-4149-8B7B-F211D448CEDA}" dt="2025-09-05T06:44:25.754" v="399" actId="14100"/>
-          <ac:picMkLst>
-            <pc:docMk/>
-            <pc:sldMk cId="1115742647" sldId="269"/>
-            <ac:picMk id="6" creationId="{B38577CC-4C55-BB32-6190-E79B0D7EEE04}"/>
-          </ac:picMkLst>
-        </pc:picChg>
       </pc:sldChg>
       <pc:sldChg chg="addSp delSp modSp add mod">
         <pc:chgData name="Dragan Javorac" userId="913c2858-fb97-4c6e-a42c-b1f1a16b225e" providerId="ADAL" clId="{BC00D9DF-F858-4149-8B7B-F211D448CEDA}" dt="2025-09-05T06:46:26.447" v="448" actId="1076"/>
@@ -415,14 +303,6 @@
             <pc:docMk/>
             <pc:sldMk cId="2731957848" sldId="270"/>
             <ac:spMk id="2" creationId="{51538BC6-F696-0411-4467-D11545529E2E}"/>
-          </ac:spMkLst>
-        </pc:spChg>
-        <pc:spChg chg="del">
-          <ac:chgData name="Dragan Javorac" userId="913c2858-fb97-4c6e-a42c-b1f1a16b225e" providerId="ADAL" clId="{BC00D9DF-F858-4149-8B7B-F211D448CEDA}" dt="2025-09-05T06:44:45.984" v="412" actId="478"/>
-          <ac:spMkLst>
-            <pc:docMk/>
-            <pc:sldMk cId="2731957848" sldId="270"/>
-            <ac:spMk id="3" creationId="{15433AC2-3906-54C6-CF69-6D0F76B30D58}"/>
           </ac:spMkLst>
         </pc:spChg>
         <pc:spChg chg="add mod">
@@ -439,22 +319,6 @@
             <pc:docMk/>
             <pc:sldMk cId="2731957848" sldId="270"/>
             <ac:picMk id="4" creationId="{2FCFE164-4701-78D8-2D11-0A243D1D7634}"/>
-          </ac:picMkLst>
-        </pc:picChg>
-        <pc:picChg chg="add del mod">
-          <ac:chgData name="Dragan Javorac" userId="913c2858-fb97-4c6e-a42c-b1f1a16b225e" providerId="ADAL" clId="{BC00D9DF-F858-4149-8B7B-F211D448CEDA}" dt="2025-09-05T06:45:29.486" v="416" actId="478"/>
-          <ac:picMkLst>
-            <pc:docMk/>
-            <pc:sldMk cId="2731957848" sldId="270"/>
-            <ac:picMk id="5" creationId="{37E660A7-5C41-AF58-172F-D4F753D8CCA3}"/>
-          </ac:picMkLst>
-        </pc:picChg>
-        <pc:picChg chg="del">
-          <ac:chgData name="Dragan Javorac" userId="913c2858-fb97-4c6e-a42c-b1f1a16b225e" providerId="ADAL" clId="{BC00D9DF-F858-4149-8B7B-F211D448CEDA}" dt="2025-09-05T06:44:46.494" v="413" actId="478"/>
-          <ac:picMkLst>
-            <pc:docMk/>
-            <pc:sldMk cId="2731957848" sldId="270"/>
-            <ac:picMk id="6" creationId="{FB9AFF44-4D6D-165F-0C63-9B197EB28897}"/>
           </ac:picMkLst>
         </pc:picChg>
         <pc:picChg chg="add mod modCrop">
@@ -511,14 +375,6 @@
             <ac:spMk id="3" creationId="{A405F7DD-9242-B6BC-1EAE-CB92C0013162}"/>
           </ac:spMkLst>
         </pc:spChg>
-        <pc:picChg chg="del mod">
-          <ac:chgData name="Dragan Javorac" userId="913c2858-fb97-4c6e-a42c-b1f1a16b225e" providerId="ADAL" clId="{BC00D9DF-F858-4149-8B7B-F211D448CEDA}" dt="2025-09-05T06:48:42.098" v="596" actId="478"/>
-          <ac:picMkLst>
-            <pc:docMk/>
-            <pc:sldMk cId="72577928" sldId="272"/>
-            <ac:picMk id="5" creationId="{332B467D-F029-B11A-A1FA-F022F80FFE2A}"/>
-          </ac:picMkLst>
-        </pc:picChg>
         <pc:picChg chg="add mod">
           <ac:chgData name="Dragan Javorac" userId="913c2858-fb97-4c6e-a42c-b1f1a16b225e" providerId="ADAL" clId="{BC00D9DF-F858-4149-8B7B-F211D448CEDA}" dt="2025-09-05T06:48:43.823" v="598" actId="1076"/>
           <ac:picMkLst>
@@ -529,7 +385,7 @@
         </pc:picChg>
       </pc:sldChg>
       <pc:sldChg chg="modSp add mod">
-        <pc:chgData name="Dragan Javorac" userId="913c2858-fb97-4c6e-a42c-b1f1a16b225e" providerId="ADAL" clId="{BC00D9DF-F858-4149-8B7B-F211D448CEDA}" dt="2025-09-05T06:50:07.754" v="840" actId="20577"/>
+        <pc:chgData name="Dragan Javorac" userId="913c2858-fb97-4c6e-a42c-b1f1a16b225e" providerId="ADAL" clId="{BC00D9DF-F858-4149-8B7B-F211D448CEDA}" dt="2025-09-09T10:02:02.137" v="1535" actId="14"/>
         <pc:sldMkLst>
           <pc:docMk/>
           <pc:sldMk cId="629062919" sldId="273"/>
@@ -543,7 +399,7 @@
           </ac:spMkLst>
         </pc:spChg>
         <pc:spChg chg="mod">
-          <ac:chgData name="Dragan Javorac" userId="913c2858-fb97-4c6e-a42c-b1f1a16b225e" providerId="ADAL" clId="{BC00D9DF-F858-4149-8B7B-F211D448CEDA}" dt="2025-09-05T06:50:07.754" v="840" actId="20577"/>
+          <ac:chgData name="Dragan Javorac" userId="913c2858-fb97-4c6e-a42c-b1f1a16b225e" providerId="ADAL" clId="{BC00D9DF-F858-4149-8B7B-F211D448CEDA}" dt="2025-09-09T10:02:02.137" v="1535" actId="14"/>
           <ac:spMkLst>
             <pc:docMk/>
             <pc:sldMk cId="629062919" sldId="273"/>
@@ -552,7 +408,7 @@
         </pc:spChg>
       </pc:sldChg>
       <pc:sldChg chg="addSp delSp modSp add mod">
-        <pc:chgData name="Dragan Javorac" userId="913c2858-fb97-4c6e-a42c-b1f1a16b225e" providerId="ADAL" clId="{BC00D9DF-F858-4149-8B7B-F211D448CEDA}" dt="2025-09-05T06:51:24.184" v="941" actId="20577"/>
+        <pc:chgData name="Dragan Javorac" userId="913c2858-fb97-4c6e-a42c-b1f1a16b225e" providerId="ADAL" clId="{BC00D9DF-F858-4149-8B7B-F211D448CEDA}" dt="2025-09-09T10:01:35.537" v="1493" actId="1076"/>
         <pc:sldMkLst>
           <pc:docMk/>
           <pc:sldMk cId="3383277416" sldId="274"/>
@@ -574,19 +430,27 @@
           </ac:spMkLst>
         </pc:spChg>
         <pc:picChg chg="add mod">
-          <ac:chgData name="Dragan Javorac" userId="913c2858-fb97-4c6e-a42c-b1f1a16b225e" providerId="ADAL" clId="{BC00D9DF-F858-4149-8B7B-F211D448CEDA}" dt="2025-09-05T06:50:45.994" v="877" actId="1076"/>
+          <ac:chgData name="Dragan Javorac" userId="913c2858-fb97-4c6e-a42c-b1f1a16b225e" providerId="ADAL" clId="{BC00D9DF-F858-4149-8B7B-F211D448CEDA}" dt="2025-09-09T10:01:33.598" v="1492" actId="1076"/>
           <ac:picMkLst>
             <pc:docMk/>
             <pc:sldMk cId="3383277416" sldId="274"/>
             <ac:picMk id="5" creationId="{8DC3CE06-46C3-1D2E-F75B-018CD620B5EE}"/>
           </ac:picMkLst>
         </pc:picChg>
-        <pc:picChg chg="del">
-          <ac:chgData name="Dragan Javorac" userId="913c2858-fb97-4c6e-a42c-b1f1a16b225e" providerId="ADAL" clId="{BC00D9DF-F858-4149-8B7B-F211D448CEDA}" dt="2025-09-05T06:50:44.207" v="875" actId="478"/>
+        <pc:picChg chg="add mod">
+          <ac:chgData name="Dragan Javorac" userId="913c2858-fb97-4c6e-a42c-b1f1a16b225e" providerId="ADAL" clId="{BC00D9DF-F858-4149-8B7B-F211D448CEDA}" dt="2025-09-09T10:01:28.249" v="1490" actId="1076"/>
           <ac:picMkLst>
             <pc:docMk/>
             <pc:sldMk cId="3383277416" sldId="274"/>
-            <ac:picMk id="6" creationId="{A256AC14-C29B-5FA3-0876-7E181BE0C160}"/>
+            <ac:picMk id="6" creationId="{2F942C12-3CBB-FF31-5A52-8827EB809DBC}"/>
+          </ac:picMkLst>
+        </pc:picChg>
+        <pc:picChg chg="add mod">
+          <ac:chgData name="Dragan Javorac" userId="913c2858-fb97-4c6e-a42c-b1f1a16b225e" providerId="ADAL" clId="{BC00D9DF-F858-4149-8B7B-F211D448CEDA}" dt="2025-09-09T10:01:35.537" v="1493" actId="1076"/>
+          <ac:picMkLst>
+            <pc:docMk/>
+            <pc:sldMk cId="3383277416" sldId="274"/>
+            <ac:picMk id="8" creationId="{B398B062-F17D-ECFC-F817-2B8D8E2591C8}"/>
           </ac:picMkLst>
         </pc:picChg>
       </pc:sldChg>
@@ -635,14 +499,6 @@
             <ac:spMk id="3" creationId="{93B232BB-7CF5-D324-2A40-582336244F09}"/>
           </ac:spMkLst>
         </pc:spChg>
-        <pc:picChg chg="del">
-          <ac:chgData name="Dragan Javorac" userId="913c2858-fb97-4c6e-a42c-b1f1a16b225e" providerId="ADAL" clId="{BC00D9DF-F858-4149-8B7B-F211D448CEDA}" dt="2025-09-05T06:52:34.729" v="1024" actId="478"/>
-          <ac:picMkLst>
-            <pc:docMk/>
-            <pc:sldMk cId="1534339280" sldId="276"/>
-            <ac:picMk id="5" creationId="{7A16CC89-D6E3-C22B-7508-1AF40E0F1079}"/>
-          </ac:picMkLst>
-        </pc:picChg>
         <pc:picChg chg="add mod">
           <ac:chgData name="Dragan Javorac" userId="913c2858-fb97-4c6e-a42c-b1f1a16b225e" providerId="ADAL" clId="{BC00D9DF-F858-4149-8B7B-F211D448CEDA}" dt="2025-09-05T06:52:36.284" v="1026" actId="1076"/>
           <ac:picMkLst>
@@ -697,14 +553,6 @@
             <ac:spMk id="3" creationId="{11966F84-88AB-F907-8C1A-AC4E7334EE8E}"/>
           </ac:spMkLst>
         </pc:spChg>
-        <pc:picChg chg="del">
-          <ac:chgData name="Dragan Javorac" userId="913c2858-fb97-4c6e-a42c-b1f1a16b225e" providerId="ADAL" clId="{BC00D9DF-F858-4149-8B7B-F211D448CEDA}" dt="2025-09-05T06:54:22.704" v="1211" actId="478"/>
-          <ac:picMkLst>
-            <pc:docMk/>
-            <pc:sldMk cId="807117044" sldId="278"/>
-            <ac:picMk id="5" creationId="{CE301E81-B767-31C0-5677-02BE72D17D90}"/>
-          </ac:picMkLst>
-        </pc:picChg>
         <pc:picChg chg="add mod">
           <ac:chgData name="Dragan Javorac" userId="913c2858-fb97-4c6e-a42c-b1f1a16b225e" providerId="ADAL" clId="{BC00D9DF-F858-4149-8B7B-F211D448CEDA}" dt="2025-09-05T06:54:24.144" v="1213" actId="1076"/>
           <ac:picMkLst>
@@ -745,6 +593,29 @@
           </ac:picMkLst>
         </pc:picChg>
       </pc:sldChg>
+      <pc:sldChg chg="modSp new mod">
+        <pc:chgData name="Dragan Javorac" userId="913c2858-fb97-4c6e-a42c-b1f1a16b225e" providerId="ADAL" clId="{BC00D9DF-F858-4149-8B7B-F211D448CEDA}" dt="2025-09-09T09:58:19.270" v="1480" actId="20577"/>
+        <pc:sldMkLst>
+          <pc:docMk/>
+          <pc:sldMk cId="1006738588" sldId="280"/>
+        </pc:sldMkLst>
+        <pc:spChg chg="mod">
+          <ac:chgData name="Dragan Javorac" userId="913c2858-fb97-4c6e-a42c-b1f1a16b225e" providerId="ADAL" clId="{BC00D9DF-F858-4149-8B7B-F211D448CEDA}" dt="2025-09-09T09:57:33.699" v="1437" actId="20577"/>
+          <ac:spMkLst>
+            <pc:docMk/>
+            <pc:sldMk cId="1006738588" sldId="280"/>
+            <ac:spMk id="2" creationId="{B6CA9210-A069-A02C-6EB3-DB5DAA915421}"/>
+          </ac:spMkLst>
+        </pc:spChg>
+        <pc:spChg chg="mod">
+          <ac:chgData name="Dragan Javorac" userId="913c2858-fb97-4c6e-a42c-b1f1a16b225e" providerId="ADAL" clId="{BC00D9DF-F858-4149-8B7B-F211D448CEDA}" dt="2025-09-09T09:58:19.270" v="1480" actId="20577"/>
+          <ac:spMkLst>
+            <pc:docMk/>
+            <pc:sldMk cId="1006738588" sldId="280"/>
+            <ac:spMk id="3" creationId="{987F6BB4-DAF5-074C-256E-F8F31A3CD6C1}"/>
+          </ac:spMkLst>
+        </pc:spChg>
+      </pc:sldChg>
     </pc:docChg>
   </pc:docChgLst>
 </pc:chgInfo>
@@ -832,7 +703,7 @@
           <a:p>
             <a:fld id="{0B0A3DF8-D70A-4619-BA46-AA7FA0C4FBBC}" type="datetimeFigureOut">
               <a:rPr lang="nl-NL" smtClean="0"/>
-              <a:t>5-9-2025</a:t>
+              <a:t>9-9-2025</a:t>
             </a:fld>
             <a:endParaRPr lang="nl-NL"/>
           </a:p>
@@ -1215,7 +1086,7 @@
           <a:p>
             <a:fld id="{A1F6000E-0881-45DC-955C-C3633DA62B38}" type="slidenum">
               <a:rPr lang="nl-NL" smtClean="0"/>
-              <a:t>12</a:t>
+              <a:t>13</a:t>
             </a:fld>
             <a:endParaRPr lang="nl-NL"/>
           </a:p>
@@ -1365,7 +1236,7 @@
           <a:p>
             <a:fld id="{C2BB04E2-8F0E-4C62-9794-A51F54BB41AC}" type="datetimeFigureOut">
               <a:rPr lang="nl-NL" smtClean="0"/>
-              <a:t>5-9-2025</a:t>
+              <a:t>9-9-2025</a:t>
             </a:fld>
             <a:endParaRPr lang="nl-NL"/>
           </a:p>
@@ -1535,7 +1406,7 @@
           <a:p>
             <a:fld id="{C2BB04E2-8F0E-4C62-9794-A51F54BB41AC}" type="datetimeFigureOut">
               <a:rPr lang="nl-NL" smtClean="0"/>
-              <a:t>5-9-2025</a:t>
+              <a:t>9-9-2025</a:t>
             </a:fld>
             <a:endParaRPr lang="nl-NL"/>
           </a:p>
@@ -1715,7 +1586,7 @@
           <a:p>
             <a:fld id="{C2BB04E2-8F0E-4C62-9794-A51F54BB41AC}" type="datetimeFigureOut">
               <a:rPr lang="nl-NL" smtClean="0"/>
-              <a:t>5-9-2025</a:t>
+              <a:t>9-9-2025</a:t>
             </a:fld>
             <a:endParaRPr lang="nl-NL"/>
           </a:p>
@@ -1885,7 +1756,7 @@
           <a:p>
             <a:fld id="{C2BB04E2-8F0E-4C62-9794-A51F54BB41AC}" type="datetimeFigureOut">
               <a:rPr lang="nl-NL" smtClean="0"/>
-              <a:t>5-9-2025</a:t>
+              <a:t>9-9-2025</a:t>
             </a:fld>
             <a:endParaRPr lang="nl-NL"/>
           </a:p>
@@ -2131,7 +2002,7 @@
           <a:p>
             <a:fld id="{C2BB04E2-8F0E-4C62-9794-A51F54BB41AC}" type="datetimeFigureOut">
               <a:rPr lang="nl-NL" smtClean="0"/>
-              <a:t>5-9-2025</a:t>
+              <a:t>9-9-2025</a:t>
             </a:fld>
             <a:endParaRPr lang="nl-NL"/>
           </a:p>
@@ -2363,7 +2234,7 @@
           <a:p>
             <a:fld id="{C2BB04E2-8F0E-4C62-9794-A51F54BB41AC}" type="datetimeFigureOut">
               <a:rPr lang="nl-NL" smtClean="0"/>
-              <a:t>5-9-2025</a:t>
+              <a:t>9-9-2025</a:t>
             </a:fld>
             <a:endParaRPr lang="nl-NL"/>
           </a:p>
@@ -2730,7 +2601,7 @@
           <a:p>
             <a:fld id="{C2BB04E2-8F0E-4C62-9794-A51F54BB41AC}" type="datetimeFigureOut">
               <a:rPr lang="nl-NL" smtClean="0"/>
-              <a:t>5-9-2025</a:t>
+              <a:t>9-9-2025</a:t>
             </a:fld>
             <a:endParaRPr lang="nl-NL"/>
           </a:p>
@@ -2848,7 +2719,7 @@
           <a:p>
             <a:fld id="{C2BB04E2-8F0E-4C62-9794-A51F54BB41AC}" type="datetimeFigureOut">
               <a:rPr lang="nl-NL" smtClean="0"/>
-              <a:t>5-9-2025</a:t>
+              <a:t>9-9-2025</a:t>
             </a:fld>
             <a:endParaRPr lang="nl-NL"/>
           </a:p>
@@ -2943,7 +2814,7 @@
           <a:p>
             <a:fld id="{C2BB04E2-8F0E-4C62-9794-A51F54BB41AC}" type="datetimeFigureOut">
               <a:rPr lang="nl-NL" smtClean="0"/>
-              <a:t>5-9-2025</a:t>
+              <a:t>9-9-2025</a:t>
             </a:fld>
             <a:endParaRPr lang="nl-NL"/>
           </a:p>
@@ -3220,7 +3091,7 @@
           <a:p>
             <a:fld id="{C2BB04E2-8F0E-4C62-9794-A51F54BB41AC}" type="datetimeFigureOut">
               <a:rPr lang="nl-NL" smtClean="0"/>
-              <a:t>5-9-2025</a:t>
+              <a:t>9-9-2025</a:t>
             </a:fld>
             <a:endParaRPr lang="nl-NL"/>
           </a:p>
@@ -3477,7 +3348,7 @@
           <a:p>
             <a:fld id="{C2BB04E2-8F0E-4C62-9794-A51F54BB41AC}" type="datetimeFigureOut">
               <a:rPr lang="nl-NL" smtClean="0"/>
-              <a:t>5-9-2025</a:t>
+              <a:t>9-9-2025</a:t>
             </a:fld>
             <a:endParaRPr lang="nl-NL"/>
           </a:p>
@@ -3690,7 +3561,7 @@
           <a:p>
             <a:fld id="{C2BB04E2-8F0E-4C62-9794-A51F54BB41AC}" type="datetimeFigureOut">
               <a:rPr lang="nl-NL" smtClean="0"/>
-              <a:t>5-9-2025</a:t>
+              <a:t>9-9-2025</a:t>
             </a:fld>
             <a:endParaRPr lang="nl-NL"/>
           </a:p>
@@ -4144,7 +4015,10 @@
           <a:bodyPr/>
           <a:lstStyle/>
           <a:p>
-            <a:endParaRPr lang="nl-NL"/>
+            <a:r>
+              <a:rPr lang="nl-NL" dirty="0"/>
+              <a:t>Full stack project</a:t>
+            </a:r>
           </a:p>
         </p:txBody>
       </p:sp>
@@ -4162,6 +4036,184 @@
 </file>
 
 <file path=ppt/slides/slide10.xml><?xml version="1.0" encoding="utf-8"?>
+<p:sld xmlns:a="http://schemas.openxmlformats.org/drawingml/2006/main" xmlns:r="http://schemas.openxmlformats.org/officeDocument/2006/relationships" xmlns:p="http://schemas.openxmlformats.org/presentationml/2006/main">
+  <p:cSld>
+    <p:spTree>
+      <p:nvGrpSpPr>
+        <p:cNvPr id="1" name="">
+          <a:extLst>
+            <a:ext uri="{FF2B5EF4-FFF2-40B4-BE49-F238E27FC236}">
+              <a16:creationId xmlns:a16="http://schemas.microsoft.com/office/drawing/2014/main" id="{137ADCFA-320E-7306-9A68-C1F4F575D11C}"/>
+            </a:ext>
+          </a:extLst>
+        </p:cNvPr>
+        <p:cNvGrpSpPr/>
+        <p:nvPr/>
+      </p:nvGrpSpPr>
+      <p:grpSpPr>
+        <a:xfrm>
+          <a:off x="0" y="0"/>
+          <a:ext cx="0" cy="0"/>
+          <a:chOff x="0" y="0"/>
+          <a:chExt cx="0" cy="0"/>
+        </a:xfrm>
+      </p:grpSpPr>
+      <p:sp>
+        <p:nvSpPr>
+          <p:cNvPr id="2" name="Title 1">
+            <a:extLst>
+              <a:ext uri="{FF2B5EF4-FFF2-40B4-BE49-F238E27FC236}">
+                <a16:creationId xmlns:a16="http://schemas.microsoft.com/office/drawing/2014/main" id="{03731C21-8602-2164-4482-84CEC59F3D34}"/>
+              </a:ext>
+            </a:extLst>
+          </p:cNvPr>
+          <p:cNvSpPr>
+            <a:spLocks noGrp="1"/>
+          </p:cNvSpPr>
+          <p:nvPr>
+            <p:ph type="title"/>
+          </p:nvPr>
+        </p:nvSpPr>
+        <p:spPr/>
+        <p:txBody>
+          <a:bodyPr>
+            <a:normAutofit/>
+          </a:bodyPr>
+          <a:lstStyle/>
+          <a:p>
+            <a:r>
+              <a:rPr lang="nl-NL" dirty="0"/>
+              <a:t>Verbinden met database</a:t>
+            </a:r>
+          </a:p>
+        </p:txBody>
+      </p:sp>
+      <p:sp>
+        <p:nvSpPr>
+          <p:cNvPr id="3" name="Content Placeholder 2">
+            <a:extLst>
+              <a:ext uri="{FF2B5EF4-FFF2-40B4-BE49-F238E27FC236}">
+                <a16:creationId xmlns:a16="http://schemas.microsoft.com/office/drawing/2014/main" id="{93B232BB-7CF5-D324-2A40-582336244F09}"/>
+              </a:ext>
+            </a:extLst>
+          </p:cNvPr>
+          <p:cNvSpPr>
+            <a:spLocks noGrp="1"/>
+          </p:cNvSpPr>
+          <p:nvPr>
+            <p:ph idx="1"/>
+          </p:nvPr>
+        </p:nvSpPr>
+        <p:spPr/>
+        <p:txBody>
+          <a:bodyPr>
+            <a:normAutofit/>
+          </a:bodyPr>
+          <a:lstStyle/>
+          <a:p>
+            <a:r>
+              <a:rPr lang="nl-NL" dirty="0"/>
+              <a:t>2 soorten:</a:t>
+            </a:r>
+          </a:p>
+          <a:p>
+            <a:pPr lvl="1"/>
+            <a:r>
+              <a:rPr lang="nl-NL" dirty="0"/>
+              <a:t>De applicaties</a:t>
+            </a:r>
+          </a:p>
+          <a:p>
+            <a:pPr lvl="2"/>
+            <a:r>
+              <a:rPr lang="nl-NL" dirty="0"/>
+              <a:t>Configuratie met .</a:t>
+            </a:r>
+            <a:r>
+              <a:rPr lang="nl-NL" dirty="0" err="1"/>
+              <a:t>env</a:t>
+            </a:r>
+            <a:r>
+              <a:rPr lang="nl-NL" dirty="0"/>
+              <a:t> en </a:t>
+            </a:r>
+            <a:r>
+              <a:rPr lang="nl-NL" dirty="0" err="1"/>
+              <a:t>php</a:t>
+            </a:r>
+            <a:r>
+              <a:rPr lang="nl-NL" dirty="0"/>
+              <a:t> </a:t>
+            </a:r>
+          </a:p>
+          <a:p>
+            <a:pPr lvl="1"/>
+            <a:r>
+              <a:rPr lang="nl-NL" dirty="0"/>
+              <a:t>Developers/Database </a:t>
+            </a:r>
+            <a:r>
+              <a:rPr lang="nl-NL" dirty="0" err="1"/>
+              <a:t>admins</a:t>
+            </a:r>
+            <a:endParaRPr lang="nl-NL" dirty="0"/>
+          </a:p>
+          <a:p>
+            <a:pPr lvl="2"/>
+            <a:r>
+              <a:rPr lang="nl-NL" dirty="0"/>
+              <a:t>Via tools</a:t>
+            </a:r>
+          </a:p>
+          <a:p>
+            <a:endParaRPr lang="nl-NL" dirty="0"/>
+          </a:p>
+        </p:txBody>
+      </p:sp>
+      <p:pic>
+        <p:nvPicPr>
+          <p:cNvPr id="6" name="Picture 5">
+            <a:extLst>
+              <a:ext uri="{FF2B5EF4-FFF2-40B4-BE49-F238E27FC236}">
+                <a16:creationId xmlns:a16="http://schemas.microsoft.com/office/drawing/2014/main" id="{C3957840-CBB0-F808-1060-53E4C084D2F5}"/>
+              </a:ext>
+            </a:extLst>
+          </p:cNvPr>
+          <p:cNvPicPr>
+            <a:picLocks noChangeAspect="1"/>
+          </p:cNvPicPr>
+          <p:nvPr/>
+        </p:nvPicPr>
+        <p:blipFill>
+          <a:blip r:embed="rId2"/>
+          <a:stretch>
+            <a:fillRect/>
+          </a:stretch>
+        </p:blipFill>
+        <p:spPr>
+          <a:xfrm>
+            <a:off x="6376127" y="3125038"/>
+            <a:ext cx="5815873" cy="2769231"/>
+          </a:xfrm>
+          <a:prstGeom prst="rect">
+            <a:avLst/>
+          </a:prstGeom>
+        </p:spPr>
+      </p:pic>
+    </p:spTree>
+    <p:extLst>
+      <p:ext uri="{BB962C8B-B14F-4D97-AF65-F5344CB8AC3E}">
+        <p14:creationId xmlns:p14="http://schemas.microsoft.com/office/powerpoint/2010/main" val="1534339280"/>
+      </p:ext>
+    </p:extLst>
+  </p:cSld>
+  <p:clrMapOvr>
+    <a:masterClrMapping/>
+  </p:clrMapOvr>
+</p:sld>
+</file>
+
+<file path=ppt/slides/slide11.xml><?xml version="1.0" encoding="utf-8"?>
 <p:sld xmlns:a="http://schemas.openxmlformats.org/drawingml/2006/main" xmlns:r="http://schemas.openxmlformats.org/officeDocument/2006/relationships" xmlns:p="http://schemas.openxmlformats.org/presentationml/2006/main">
   <p:cSld>
     <p:spTree>
@@ -4370,7 +4422,7 @@
 </p:sld>
 </file>
 
-<file path=ppt/slides/slide11.xml><?xml version="1.0" encoding="utf-8"?>
+<file path=ppt/slides/slide12.xml><?xml version="1.0" encoding="utf-8"?>
 <p:sld xmlns:a="http://schemas.openxmlformats.org/drawingml/2006/main" xmlns:r="http://schemas.openxmlformats.org/officeDocument/2006/relationships" xmlns:p="http://schemas.openxmlformats.org/presentationml/2006/main">
   <p:cSld>
     <p:spTree>
@@ -4555,7 +4607,7 @@
 </p:sld>
 </file>
 
-<file path=ppt/slides/slide12.xml><?xml version="1.0" encoding="utf-8"?>
+<file path=ppt/slides/slide13.xml><?xml version="1.0" encoding="utf-8"?>
 <p:sld xmlns:a="http://schemas.openxmlformats.org/drawingml/2006/main" xmlns:r="http://schemas.openxmlformats.org/officeDocument/2006/relationships" xmlns:p="http://schemas.openxmlformats.org/presentationml/2006/main">
   <p:cSld>
     <p:spTree>
@@ -4723,7 +4775,7 @@
 </p:sld>
 </file>
 
-<file path=ppt/slides/slide13.xml><?xml version="1.0" encoding="utf-8"?>
+<file path=ppt/slides/slide14.xml><?xml version="1.0" encoding="utf-8"?>
 <p:sld xmlns:a="http://schemas.openxmlformats.org/drawingml/2006/main" xmlns:r="http://schemas.openxmlformats.org/officeDocument/2006/relationships" xmlns:p="http://schemas.openxmlformats.org/presentationml/2006/main">
   <p:cSld>
     <p:spTree>
@@ -4968,6 +5020,12 @@
           <a:p>
             <a:r>
               <a:rPr lang="nl-NL" dirty="0"/>
+              <a:t>Wat gaan we maken?</a:t>
+            </a:r>
+          </a:p>
+          <a:p>
+            <a:r>
+              <a:rPr lang="nl-NL" dirty="0"/>
               <a:t>Wat heb je nodig?</a:t>
             </a:r>
           </a:p>
@@ -5026,6 +5084,105 @@
           <p:cNvPr id="2" name="Title 1">
             <a:extLst>
               <a:ext uri="{FF2B5EF4-FFF2-40B4-BE49-F238E27FC236}">
+                <a16:creationId xmlns:a16="http://schemas.microsoft.com/office/drawing/2014/main" id="{B6CA9210-A069-A02C-6EB3-DB5DAA915421}"/>
+              </a:ext>
+            </a:extLst>
+          </p:cNvPr>
+          <p:cNvSpPr>
+            <a:spLocks noGrp="1"/>
+          </p:cNvSpPr>
+          <p:nvPr>
+            <p:ph type="title"/>
+          </p:nvPr>
+        </p:nvSpPr>
+        <p:spPr/>
+        <p:txBody>
+          <a:bodyPr/>
+          <a:lstStyle/>
+          <a:p>
+            <a:r>
+              <a:rPr lang="nl-NL" dirty="0"/>
+              <a:t>Wat gaan we maken</a:t>
+            </a:r>
+          </a:p>
+        </p:txBody>
+      </p:sp>
+      <p:sp>
+        <p:nvSpPr>
+          <p:cNvPr id="3" name="Content Placeholder 2">
+            <a:extLst>
+              <a:ext uri="{FF2B5EF4-FFF2-40B4-BE49-F238E27FC236}">
+                <a16:creationId xmlns:a16="http://schemas.microsoft.com/office/drawing/2014/main" id="{987F6BB4-DAF5-074C-256E-F8F31A3CD6C1}"/>
+              </a:ext>
+            </a:extLst>
+          </p:cNvPr>
+          <p:cNvSpPr>
+            <a:spLocks noGrp="1"/>
+          </p:cNvSpPr>
+          <p:nvPr>
+            <p:ph idx="1"/>
+          </p:nvPr>
+        </p:nvSpPr>
+        <p:spPr/>
+        <p:txBody>
+          <a:bodyPr/>
+          <a:lstStyle/>
+          <a:p>
+            <a:r>
+              <a:rPr lang="nl-NL" dirty="0"/>
+              <a:t>Muziek bibliotheek</a:t>
+            </a:r>
+          </a:p>
+          <a:p>
+            <a:r>
+              <a:rPr lang="nl-NL" dirty="0"/>
+              <a:t>Demo:</a:t>
+            </a:r>
+          </a:p>
+          <a:p>
+            <a:pPr lvl="1"/>
+            <a:r>
+              <a:rPr lang="nl-NL" dirty="0"/>
+              <a:t>even laten zien</a:t>
+            </a:r>
+          </a:p>
+        </p:txBody>
+      </p:sp>
+    </p:spTree>
+    <p:extLst>
+      <p:ext uri="{BB962C8B-B14F-4D97-AF65-F5344CB8AC3E}">
+        <p14:creationId xmlns:p14="http://schemas.microsoft.com/office/powerpoint/2010/main" val="1006738588"/>
+      </p:ext>
+    </p:extLst>
+  </p:cSld>
+  <p:clrMapOvr>
+    <a:masterClrMapping/>
+  </p:clrMapOvr>
+</p:sld>
+</file>
+
+<file path=ppt/slides/slide4.xml><?xml version="1.0" encoding="utf-8"?>
+<p:sld xmlns:a="http://schemas.openxmlformats.org/drawingml/2006/main" xmlns:r="http://schemas.openxmlformats.org/officeDocument/2006/relationships" xmlns:p="http://schemas.openxmlformats.org/presentationml/2006/main">
+  <p:cSld>
+    <p:spTree>
+      <p:nvGrpSpPr>
+        <p:cNvPr id="1" name=""/>
+        <p:cNvGrpSpPr/>
+        <p:nvPr/>
+      </p:nvGrpSpPr>
+      <p:grpSpPr>
+        <a:xfrm>
+          <a:off x="0" y="0"/>
+          <a:ext cx="0" cy="0"/>
+          <a:chOff x="0" y="0"/>
+          <a:chExt cx="0" cy="0"/>
+        </a:xfrm>
+      </p:grpSpPr>
+      <p:sp>
+        <p:nvSpPr>
+          <p:cNvPr id="2" name="Title 1">
+            <a:extLst>
+              <a:ext uri="{FF2B5EF4-FFF2-40B4-BE49-F238E27FC236}">
                 <a16:creationId xmlns:a16="http://schemas.microsoft.com/office/drawing/2014/main" id="{BAE6D6CB-2DC7-8352-60DA-35EC29AEF5FE}"/>
               </a:ext>
             </a:extLst>
@@ -5093,14 +5250,14 @@
             </a:r>
             <a:r>
               <a:rPr lang="nl-NL" i="1" dirty="0"/>
-              <a:t>  / IIS)</a:t>
+              <a:t> )</a:t>
             </a:r>
           </a:p>
           <a:p>
             <a:pPr lvl="1"/>
             <a:r>
               <a:rPr lang="nl-NL" i="1" dirty="0"/>
-              <a:t>Je webserver programma</a:t>
+              <a:t>Je webserver/forward programma</a:t>
             </a:r>
             <a:endParaRPr lang="nl-NL" dirty="0"/>
           </a:p>
@@ -5269,7 +5426,7 @@
 </p:sld>
 </file>
 
-<file path=ppt/slides/slide4.xml><?xml version="1.0" encoding="utf-8"?>
+<file path=ppt/slides/slide5.xml><?xml version="1.0" encoding="utf-8"?>
 <p:sld xmlns:a="http://schemas.openxmlformats.org/drawingml/2006/main" xmlns:r="http://schemas.openxmlformats.org/officeDocument/2006/relationships" xmlns:p="http://schemas.openxmlformats.org/presentationml/2006/main">
   <p:cSld>
     <p:spTree>
@@ -5467,7 +5624,7 @@
 </p:sld>
 </file>
 
-<file path=ppt/slides/slide5.xml><?xml version="1.0" encoding="utf-8"?>
+<file path=ppt/slides/slide6.xml><?xml version="1.0" encoding="utf-8"?>
 <p:sld xmlns:a="http://schemas.openxmlformats.org/drawingml/2006/main" xmlns:r="http://schemas.openxmlformats.org/officeDocument/2006/relationships" xmlns:p="http://schemas.openxmlformats.org/presentationml/2006/main">
   <p:cSld>
     <p:spTree>
@@ -5642,7 +5799,7 @@
 </p:sld>
 </file>
 
-<file path=ppt/slides/slide6.xml><?xml version="1.0" encoding="utf-8"?>
+<file path=ppt/slides/slide7.xml><?xml version="1.0" encoding="utf-8"?>
 <p:sld xmlns:a="http://schemas.openxmlformats.org/drawingml/2006/main" xmlns:r="http://schemas.openxmlformats.org/officeDocument/2006/relationships" xmlns:p="http://schemas.openxmlformats.org/presentationml/2006/main">
   <p:cSld>
     <p:spTree>
@@ -5786,17 +5943,20 @@
               <a:rPr lang="nl-NL" dirty="0" err="1"/>
               <a:t>premise</a:t>
             </a:r>
-            <a:r>
-              <a:rPr lang="nl-NL" dirty="0"/>
-              <a:t> (in het </a:t>
-            </a:r>
-            <a:r>
-              <a:rPr lang="nl-NL" dirty="0" err="1"/>
-              <a:t>bedrijfs</a:t>
-            </a:r>
-            <a:r>
-              <a:rPr lang="nl-NL" dirty="0"/>
-              <a:t> datacentrum)</a:t>
+            <a:endParaRPr lang="nl-NL" dirty="0"/>
+          </a:p>
+          <a:p>
+            <a:pPr lvl="3"/>
+            <a:r>
+              <a:rPr lang="nl-NL" dirty="0"/>
+              <a:t>in het datacentrum van het bedrijf</a:t>
+            </a:r>
+          </a:p>
+          <a:p>
+            <a:pPr lvl="2"/>
+            <a:r>
+              <a:rPr lang="nl-NL" dirty="0"/>
+              <a:t>Gehuurde server</a:t>
             </a:r>
           </a:p>
           <a:p>
@@ -5871,7 +6031,7 @@
 </p:sld>
 </file>
 
-<file path=ppt/slides/slide7.xml><?xml version="1.0" encoding="utf-8"?>
+<file path=ppt/slides/slide8.xml><?xml version="1.0" encoding="utf-8"?>
 <p:sld xmlns:a="http://schemas.openxmlformats.org/drawingml/2006/main" xmlns:r="http://schemas.openxmlformats.org/officeDocument/2006/relationships" xmlns:p="http://schemas.openxmlformats.org/presentationml/2006/main">
   <p:cSld>
     <p:spTree>
@@ -6024,8 +6184,68 @@
         </p:blipFill>
         <p:spPr>
           <a:xfrm>
-            <a:off x="8732036" y="3122330"/>
+            <a:off x="8736460" y="365125"/>
             <a:ext cx="2741397" cy="2741397"/>
+          </a:xfrm>
+          <a:prstGeom prst="rect">
+            <a:avLst/>
+          </a:prstGeom>
+        </p:spPr>
+      </p:pic>
+      <p:pic>
+        <p:nvPicPr>
+          <p:cNvPr id="6" name="Picture 5">
+            <a:extLst>
+              <a:ext uri="{FF2B5EF4-FFF2-40B4-BE49-F238E27FC236}">
+                <a16:creationId xmlns:a16="http://schemas.microsoft.com/office/drawing/2014/main" id="{2F942C12-3CBB-FF31-5A52-8827EB809DBC}"/>
+              </a:ext>
+            </a:extLst>
+          </p:cNvPr>
+          <p:cNvPicPr>
+            <a:picLocks noChangeAspect="1"/>
+          </p:cNvPicPr>
+          <p:nvPr/>
+        </p:nvPicPr>
+        <p:blipFill>
+          <a:blip r:embed="rId3"/>
+          <a:stretch>
+            <a:fillRect/>
+          </a:stretch>
+        </p:blipFill>
+        <p:spPr>
+          <a:xfrm>
+            <a:off x="8530772" y="4120599"/>
+            <a:ext cx="3152775" cy="2600325"/>
+          </a:xfrm>
+          <a:prstGeom prst="rect">
+            <a:avLst/>
+          </a:prstGeom>
+        </p:spPr>
+      </p:pic>
+      <p:pic>
+        <p:nvPicPr>
+          <p:cNvPr id="8" name="Picture 7">
+            <a:extLst>
+              <a:ext uri="{FF2B5EF4-FFF2-40B4-BE49-F238E27FC236}">
+                <a16:creationId xmlns:a16="http://schemas.microsoft.com/office/drawing/2014/main" id="{B398B062-F17D-ECFC-F817-2B8D8E2591C8}"/>
+              </a:ext>
+            </a:extLst>
+          </p:cNvPr>
+          <p:cNvPicPr>
+            <a:picLocks noChangeAspect="1"/>
+          </p:cNvPicPr>
+          <p:nvPr/>
+        </p:nvPicPr>
+        <p:blipFill>
+          <a:blip r:embed="rId4"/>
+          <a:stretch>
+            <a:fillRect/>
+          </a:stretch>
+        </p:blipFill>
+        <p:spPr>
+          <a:xfrm>
+            <a:off x="3661229" y="4415874"/>
+            <a:ext cx="4610100" cy="2305050"/>
           </a:xfrm>
           <a:prstGeom prst="rect">
             <a:avLst/>
@@ -6045,7 +6265,7 @@
 </p:sld>
 </file>
 
-<file path=ppt/slides/slide8.xml><?xml version="1.0" encoding="utf-8"?>
+<file path=ppt/slides/slide9.xml><?xml version="1.0" encoding="utf-8"?>
 <p:sld xmlns:a="http://schemas.openxmlformats.org/drawingml/2006/main" xmlns:r="http://schemas.openxmlformats.org/officeDocument/2006/relationships" xmlns:p="http://schemas.openxmlformats.org/presentationml/2006/main">
   <p:cSld>
     <p:spTree>
@@ -6174,184 +6394,6 @@
     <p:extLst>
       <p:ext uri="{BB962C8B-B14F-4D97-AF65-F5344CB8AC3E}">
         <p14:creationId xmlns:p14="http://schemas.microsoft.com/office/powerpoint/2010/main" val="1226168324"/>
-      </p:ext>
-    </p:extLst>
-  </p:cSld>
-  <p:clrMapOvr>
-    <a:masterClrMapping/>
-  </p:clrMapOvr>
-</p:sld>
-</file>
-
-<file path=ppt/slides/slide9.xml><?xml version="1.0" encoding="utf-8"?>
-<p:sld xmlns:a="http://schemas.openxmlformats.org/drawingml/2006/main" xmlns:r="http://schemas.openxmlformats.org/officeDocument/2006/relationships" xmlns:p="http://schemas.openxmlformats.org/presentationml/2006/main">
-  <p:cSld>
-    <p:spTree>
-      <p:nvGrpSpPr>
-        <p:cNvPr id="1" name="">
-          <a:extLst>
-            <a:ext uri="{FF2B5EF4-FFF2-40B4-BE49-F238E27FC236}">
-              <a16:creationId xmlns:a16="http://schemas.microsoft.com/office/drawing/2014/main" id="{137ADCFA-320E-7306-9A68-C1F4F575D11C}"/>
-            </a:ext>
-          </a:extLst>
-        </p:cNvPr>
-        <p:cNvGrpSpPr/>
-        <p:nvPr/>
-      </p:nvGrpSpPr>
-      <p:grpSpPr>
-        <a:xfrm>
-          <a:off x="0" y="0"/>
-          <a:ext cx="0" cy="0"/>
-          <a:chOff x="0" y="0"/>
-          <a:chExt cx="0" cy="0"/>
-        </a:xfrm>
-      </p:grpSpPr>
-      <p:sp>
-        <p:nvSpPr>
-          <p:cNvPr id="2" name="Title 1">
-            <a:extLst>
-              <a:ext uri="{FF2B5EF4-FFF2-40B4-BE49-F238E27FC236}">
-                <a16:creationId xmlns:a16="http://schemas.microsoft.com/office/drawing/2014/main" id="{03731C21-8602-2164-4482-84CEC59F3D34}"/>
-              </a:ext>
-            </a:extLst>
-          </p:cNvPr>
-          <p:cNvSpPr>
-            <a:spLocks noGrp="1"/>
-          </p:cNvSpPr>
-          <p:nvPr>
-            <p:ph type="title"/>
-          </p:nvPr>
-        </p:nvSpPr>
-        <p:spPr/>
-        <p:txBody>
-          <a:bodyPr>
-            <a:normAutofit/>
-          </a:bodyPr>
-          <a:lstStyle/>
-          <a:p>
-            <a:r>
-              <a:rPr lang="nl-NL" dirty="0"/>
-              <a:t>Verbinden met database</a:t>
-            </a:r>
-          </a:p>
-        </p:txBody>
-      </p:sp>
-      <p:sp>
-        <p:nvSpPr>
-          <p:cNvPr id="3" name="Content Placeholder 2">
-            <a:extLst>
-              <a:ext uri="{FF2B5EF4-FFF2-40B4-BE49-F238E27FC236}">
-                <a16:creationId xmlns:a16="http://schemas.microsoft.com/office/drawing/2014/main" id="{93B232BB-7CF5-D324-2A40-582336244F09}"/>
-              </a:ext>
-            </a:extLst>
-          </p:cNvPr>
-          <p:cNvSpPr>
-            <a:spLocks noGrp="1"/>
-          </p:cNvSpPr>
-          <p:nvPr>
-            <p:ph idx="1"/>
-          </p:nvPr>
-        </p:nvSpPr>
-        <p:spPr/>
-        <p:txBody>
-          <a:bodyPr>
-            <a:normAutofit/>
-          </a:bodyPr>
-          <a:lstStyle/>
-          <a:p>
-            <a:r>
-              <a:rPr lang="nl-NL" dirty="0"/>
-              <a:t>2 soorten:</a:t>
-            </a:r>
-          </a:p>
-          <a:p>
-            <a:pPr lvl="1"/>
-            <a:r>
-              <a:rPr lang="nl-NL" dirty="0"/>
-              <a:t>De applicaties</a:t>
-            </a:r>
-          </a:p>
-          <a:p>
-            <a:pPr lvl="2"/>
-            <a:r>
-              <a:rPr lang="nl-NL" dirty="0"/>
-              <a:t>Configuratie met .</a:t>
-            </a:r>
-            <a:r>
-              <a:rPr lang="nl-NL" dirty="0" err="1"/>
-              <a:t>env</a:t>
-            </a:r>
-            <a:r>
-              <a:rPr lang="nl-NL" dirty="0"/>
-              <a:t> en </a:t>
-            </a:r>
-            <a:r>
-              <a:rPr lang="nl-NL" dirty="0" err="1"/>
-              <a:t>php</a:t>
-            </a:r>
-            <a:r>
-              <a:rPr lang="nl-NL" dirty="0"/>
-              <a:t> </a:t>
-            </a:r>
-          </a:p>
-          <a:p>
-            <a:pPr lvl="1"/>
-            <a:r>
-              <a:rPr lang="nl-NL" dirty="0"/>
-              <a:t>Developers/Database </a:t>
-            </a:r>
-            <a:r>
-              <a:rPr lang="nl-NL" dirty="0" err="1"/>
-              <a:t>admins</a:t>
-            </a:r>
-            <a:endParaRPr lang="nl-NL" dirty="0"/>
-          </a:p>
-          <a:p>
-            <a:pPr lvl="2"/>
-            <a:r>
-              <a:rPr lang="nl-NL" dirty="0"/>
-              <a:t>Via tools</a:t>
-            </a:r>
-          </a:p>
-          <a:p>
-            <a:endParaRPr lang="nl-NL" dirty="0"/>
-          </a:p>
-        </p:txBody>
-      </p:sp>
-      <p:pic>
-        <p:nvPicPr>
-          <p:cNvPr id="6" name="Picture 5">
-            <a:extLst>
-              <a:ext uri="{FF2B5EF4-FFF2-40B4-BE49-F238E27FC236}">
-                <a16:creationId xmlns:a16="http://schemas.microsoft.com/office/drawing/2014/main" id="{C3957840-CBB0-F808-1060-53E4C084D2F5}"/>
-              </a:ext>
-            </a:extLst>
-          </p:cNvPr>
-          <p:cNvPicPr>
-            <a:picLocks noChangeAspect="1"/>
-          </p:cNvPicPr>
-          <p:nvPr/>
-        </p:nvPicPr>
-        <p:blipFill>
-          <a:blip r:embed="rId2"/>
-          <a:stretch>
-            <a:fillRect/>
-          </a:stretch>
-        </p:blipFill>
-        <p:spPr>
-          <a:xfrm>
-            <a:off x="6376127" y="3125038"/>
-            <a:ext cx="5815873" cy="2769231"/>
-          </a:xfrm>
-          <a:prstGeom prst="rect">
-            <a:avLst/>
-          </a:prstGeom>
-        </p:spPr>
-      </p:pic>
-    </p:spTree>
-    <p:extLst>
-      <p:ext uri="{BB962C8B-B14F-4D97-AF65-F5344CB8AC3E}">
-        <p14:creationId xmlns:p14="http://schemas.microsoft.com/office/powerpoint/2010/main" val="1534339280"/>
       </p:ext>
     </p:extLst>
   </p:cSld>

</xml_diff>